<commit_message>
Adding future research opps.
</commit_message>
<xml_diff>
--- a/Arif Slides.pptx
+++ b/Arif Slides.pptx
@@ -5,13 +5,14 @@
     <p:sldMasterId id="2147483648" r:id="rId1"/>
   </p:sldMasterIdLst>
   <p:notesMasterIdLst>
-    <p:notesMasterId r:id="rId6"/>
+    <p:notesMasterId r:id="rId7"/>
   </p:notesMasterIdLst>
   <p:sldIdLst>
     <p:sldId id="257" r:id="rId2"/>
     <p:sldId id="258" r:id="rId3"/>
-    <p:sldId id="260" r:id="rId4"/>
-    <p:sldId id="259" r:id="rId5"/>
+    <p:sldId id="259" r:id="rId4"/>
+    <p:sldId id="261" r:id="rId5"/>
+    <p:sldId id="260" r:id="rId6"/>
   </p:sldIdLst>
   <p:sldSz cx="12192000" cy="6858000"/>
   <p:notesSz cx="6858000" cy="9144000"/>
@@ -617,7 +618,7 @@
           <a:p>
             <a:fld id="{54F66277-1231-2A45-B961-C920BC9B8042}" type="slidenum">
               <a:rPr lang="en-US" smtClean="0"/>
-              <a:t>4</a:t>
+              <a:t>3</a:t>
             </a:fld>
             <a:endParaRPr lang="en-US"/>
           </a:p>
@@ -627,6 +628,174 @@
     <p:extLst>
       <p:ext uri="{BB962C8B-B14F-4D97-AF65-F5344CB8AC3E}">
         <p14:creationId xmlns:p14="http://schemas.microsoft.com/office/powerpoint/2010/main" val="909483086"/>
+      </p:ext>
+    </p:extLst>
+  </p:cSld>
+  <p:clrMapOvr>
+    <a:masterClrMapping/>
+  </p:clrMapOvr>
+</p:notes>
+</file>
+
+<file path=ppt/notesSlides/notesSlide3.xml><?xml version="1.0" encoding="utf-8"?>
+<p:notes xmlns:a="http://schemas.openxmlformats.org/drawingml/2006/main" xmlns:r="http://schemas.openxmlformats.org/officeDocument/2006/relationships" xmlns:p="http://schemas.openxmlformats.org/presentationml/2006/main">
+  <p:cSld>
+    <p:spTree>
+      <p:nvGrpSpPr>
+        <p:cNvPr id="1" name=""/>
+        <p:cNvGrpSpPr/>
+        <p:nvPr/>
+      </p:nvGrpSpPr>
+      <p:grpSpPr>
+        <a:xfrm>
+          <a:off x="0" y="0"/>
+          <a:ext cx="0" cy="0"/>
+          <a:chOff x="0" y="0"/>
+          <a:chExt cx="0" cy="0"/>
+        </a:xfrm>
+      </p:grpSpPr>
+      <p:sp>
+        <p:nvSpPr>
+          <p:cNvPr id="2" name="Slide Image Placeholder 1"/>
+          <p:cNvSpPr>
+            <a:spLocks noGrp="1" noRot="1" noChangeAspect="1"/>
+          </p:cNvSpPr>
+          <p:nvPr>
+            <p:ph type="sldImg"/>
+          </p:nvPr>
+        </p:nvSpPr>
+        <p:spPr/>
+      </p:sp>
+      <p:sp>
+        <p:nvSpPr>
+          <p:cNvPr id="3" name="Notes Placeholder 2"/>
+          <p:cNvSpPr>
+            <a:spLocks noGrp="1"/>
+          </p:cNvSpPr>
+          <p:nvPr>
+            <p:ph type="body" idx="1"/>
+          </p:nvPr>
+        </p:nvSpPr>
+        <p:spPr/>
+        <p:txBody>
+          <a:bodyPr/>
+          <a:lstStyle/>
+          <a:p>
+            <a:endParaRPr lang="en-US" dirty="0"/>
+          </a:p>
+        </p:txBody>
+      </p:sp>
+      <p:sp>
+        <p:nvSpPr>
+          <p:cNvPr id="4" name="Slide Number Placeholder 3"/>
+          <p:cNvSpPr>
+            <a:spLocks noGrp="1"/>
+          </p:cNvSpPr>
+          <p:nvPr>
+            <p:ph type="sldNum" sz="quarter" idx="10"/>
+          </p:nvPr>
+        </p:nvSpPr>
+        <p:spPr/>
+        <p:txBody>
+          <a:bodyPr/>
+          <a:lstStyle/>
+          <a:p>
+            <a:fld id="{54F66277-1231-2A45-B961-C920BC9B8042}" type="slidenum">
+              <a:rPr lang="en-US" smtClean="0"/>
+              <a:t>4</a:t>
+            </a:fld>
+            <a:endParaRPr lang="en-US"/>
+          </a:p>
+        </p:txBody>
+      </p:sp>
+    </p:spTree>
+    <p:extLst>
+      <p:ext uri="{BB962C8B-B14F-4D97-AF65-F5344CB8AC3E}">
+        <p14:creationId xmlns:p14="http://schemas.microsoft.com/office/powerpoint/2010/main" val="74818279"/>
+      </p:ext>
+    </p:extLst>
+  </p:cSld>
+  <p:clrMapOvr>
+    <a:masterClrMapping/>
+  </p:clrMapOvr>
+</p:notes>
+</file>
+
+<file path=ppt/notesSlides/notesSlide4.xml><?xml version="1.0" encoding="utf-8"?>
+<p:notes xmlns:a="http://schemas.openxmlformats.org/drawingml/2006/main" xmlns:r="http://schemas.openxmlformats.org/officeDocument/2006/relationships" xmlns:p="http://schemas.openxmlformats.org/presentationml/2006/main">
+  <p:cSld>
+    <p:spTree>
+      <p:nvGrpSpPr>
+        <p:cNvPr id="1" name=""/>
+        <p:cNvGrpSpPr/>
+        <p:nvPr/>
+      </p:nvGrpSpPr>
+      <p:grpSpPr>
+        <a:xfrm>
+          <a:off x="0" y="0"/>
+          <a:ext cx="0" cy="0"/>
+          <a:chOff x="0" y="0"/>
+          <a:chExt cx="0" cy="0"/>
+        </a:xfrm>
+      </p:grpSpPr>
+      <p:sp>
+        <p:nvSpPr>
+          <p:cNvPr id="2" name="Slide Image Placeholder 1"/>
+          <p:cNvSpPr>
+            <a:spLocks noGrp="1" noRot="1" noChangeAspect="1"/>
+          </p:cNvSpPr>
+          <p:nvPr>
+            <p:ph type="sldImg"/>
+          </p:nvPr>
+        </p:nvSpPr>
+        <p:spPr/>
+      </p:sp>
+      <p:sp>
+        <p:nvSpPr>
+          <p:cNvPr id="3" name="Notes Placeholder 2"/>
+          <p:cNvSpPr>
+            <a:spLocks noGrp="1"/>
+          </p:cNvSpPr>
+          <p:nvPr>
+            <p:ph type="body" idx="1"/>
+          </p:nvPr>
+        </p:nvSpPr>
+        <p:spPr/>
+        <p:txBody>
+          <a:bodyPr/>
+          <a:lstStyle/>
+          <a:p>
+            <a:endParaRPr lang="en-US" dirty="0"/>
+          </a:p>
+        </p:txBody>
+      </p:sp>
+      <p:sp>
+        <p:nvSpPr>
+          <p:cNvPr id="4" name="Slide Number Placeholder 3"/>
+          <p:cNvSpPr>
+            <a:spLocks noGrp="1"/>
+          </p:cNvSpPr>
+          <p:nvPr>
+            <p:ph type="sldNum" sz="quarter" idx="10"/>
+          </p:nvPr>
+        </p:nvSpPr>
+        <p:spPr/>
+        <p:txBody>
+          <a:bodyPr/>
+          <a:lstStyle/>
+          <a:p>
+            <a:fld id="{5F87D9E0-510D-0F43-A304-A9F42220FEDB}" type="slidenum">
+              <a:rPr lang="en-US" smtClean="0"/>
+              <a:t>5</a:t>
+            </a:fld>
+            <a:endParaRPr lang="en-US"/>
+          </a:p>
+        </p:txBody>
+      </p:sp>
+    </p:spTree>
+    <p:extLst>
+      <p:ext uri="{BB962C8B-B14F-4D97-AF65-F5344CB8AC3E}">
+        <p14:creationId xmlns:p14="http://schemas.microsoft.com/office/powerpoint/2010/main" val="1702510521"/>
       </p:ext>
     </p:extLst>
   </p:cSld>
@@ -3635,22 +3804,31 @@
             <a:pPr lvl="1"/>
             <a:r>
               <a:rPr lang="en-US" dirty="0" smtClean="0"/>
-              <a:t>At First</a:t>
+              <a:t>At First we wanted to know:</a:t>
             </a:r>
           </a:p>
           <a:p>
             <a:pPr lvl="2"/>
             <a:r>
+              <a:rPr lang="en-US" dirty="0" smtClean="0"/>
+              <a:t>Do Political Contributes  by sectors affect whether candidates win?</a:t>
+            </a:r>
+          </a:p>
+          <a:p>
+            <a:pPr lvl="2"/>
+            <a:r>
+              <a:rPr lang="en-US" dirty="0" smtClean="0"/>
+              <a:t>Do election </a:t>
+            </a:r>
+            <a:r>
               <a:rPr lang="en-US" dirty="0"/>
-              <a:t>We wanted to see if political contributions by industries to specific candidates had any bearing on election results </a:t>
-            </a:r>
-          </a:p>
-          <a:p>
-            <a:pPr lvl="2"/>
-            <a:r>
-              <a:rPr lang="en-US" dirty="0"/>
-              <a:t>We also wanted to see if the election results had any specific impact on the market as a whole. </a:t>
-            </a:r>
+              <a:t>results had any specific impact on the market as a whole</a:t>
+            </a:r>
+            <a:r>
+              <a:rPr lang="en-US" dirty="0" smtClean="0"/>
+              <a:t>.?</a:t>
+            </a:r>
+            <a:endParaRPr lang="en-US" dirty="0"/>
           </a:p>
           <a:p>
             <a:pPr lvl="1"/>
@@ -3667,14 +3845,14 @@
             <a:pPr lvl="2"/>
             <a:r>
               <a:rPr lang="en-US" dirty="0" smtClean="0"/>
-              <a:t>The idea morphed into looking at total campaign contributions and other aspects that led to candidates winning</a:t>
+              <a:t>The idea morphed into looking at total campaign contributions </a:t>
             </a:r>
           </a:p>
           <a:p>
             <a:pPr lvl="2"/>
             <a:r>
               <a:rPr lang="en-US" dirty="0" smtClean="0"/>
-              <a:t>This was mainly due to uncovering very little with respect to stock changes and voting shifts </a:t>
+              <a:t>Due to uncovering very little with respect to stock changes and voting shifts </a:t>
             </a:r>
           </a:p>
           <a:p>
@@ -3702,7 +3880,337 @@
   <p:timing>
     <p:tnLst>
       <p:par>
-        <p:cTn id="1" dur="indefinite" restart="never" nodeType="tmRoot"/>
+        <p:cTn id="1" dur="indefinite" restart="never" nodeType="tmRoot">
+          <p:childTnLst>
+            <p:seq concurrent="1" nextAc="seek">
+              <p:cTn id="2" dur="indefinite" nodeType="mainSeq">
+                <p:childTnLst>
+                  <p:par>
+                    <p:cTn id="3" fill="hold">
+                      <p:stCondLst>
+                        <p:cond delay="indefinite"/>
+                      </p:stCondLst>
+                      <p:childTnLst>
+                        <p:par>
+                          <p:cTn id="4" fill="hold">
+                            <p:stCondLst>
+                              <p:cond delay="0"/>
+                            </p:stCondLst>
+                            <p:childTnLst>
+                              <p:par>
+                                <p:cTn id="5" presetID="1" presetClass="entr" presetSubtype="0" fill="hold" nodeType="clickEffect">
+                                  <p:stCondLst>
+                                    <p:cond delay="0"/>
+                                  </p:stCondLst>
+                                  <p:childTnLst>
+                                    <p:set>
+                                      <p:cBhvr>
+                                        <p:cTn id="6" dur="1" fill="hold">
+                                          <p:stCondLst>
+                                            <p:cond delay="0"/>
+                                          </p:stCondLst>
+                                        </p:cTn>
+                                        <p:tgtEl>
+                                          <p:spTgt spid="3">
+                                            <p:txEl>
+                                              <p:pRg st="0" end="0"/>
+                                            </p:txEl>
+                                          </p:spTgt>
+                                        </p:tgtEl>
+                                        <p:attrNameLst>
+                                          <p:attrName>style.visibility</p:attrName>
+                                        </p:attrNameLst>
+                                      </p:cBhvr>
+                                      <p:to>
+                                        <p:strVal val="visible"/>
+                                      </p:to>
+                                    </p:set>
+                                  </p:childTnLst>
+                                </p:cTn>
+                              </p:par>
+                            </p:childTnLst>
+                          </p:cTn>
+                        </p:par>
+                      </p:childTnLst>
+                    </p:cTn>
+                  </p:par>
+                  <p:par>
+                    <p:cTn id="7" fill="hold">
+                      <p:stCondLst>
+                        <p:cond delay="indefinite"/>
+                      </p:stCondLst>
+                      <p:childTnLst>
+                        <p:par>
+                          <p:cTn id="8" fill="hold">
+                            <p:stCondLst>
+                              <p:cond delay="0"/>
+                            </p:stCondLst>
+                            <p:childTnLst>
+                              <p:par>
+                                <p:cTn id="9" presetID="1" presetClass="entr" presetSubtype="0" fill="hold" nodeType="clickEffect">
+                                  <p:stCondLst>
+                                    <p:cond delay="0"/>
+                                  </p:stCondLst>
+                                  <p:childTnLst>
+                                    <p:set>
+                                      <p:cBhvr>
+                                        <p:cTn id="10" dur="1" fill="hold">
+                                          <p:stCondLst>
+                                            <p:cond delay="0"/>
+                                          </p:stCondLst>
+                                        </p:cTn>
+                                        <p:tgtEl>
+                                          <p:spTgt spid="3">
+                                            <p:txEl>
+                                              <p:pRg st="1" end="1"/>
+                                            </p:txEl>
+                                          </p:spTgt>
+                                        </p:tgtEl>
+                                        <p:attrNameLst>
+                                          <p:attrName>style.visibility</p:attrName>
+                                        </p:attrNameLst>
+                                      </p:cBhvr>
+                                      <p:to>
+                                        <p:strVal val="visible"/>
+                                      </p:to>
+                                    </p:set>
+                                  </p:childTnLst>
+                                </p:cTn>
+                              </p:par>
+                              <p:par>
+                                <p:cTn id="11" presetID="1" presetClass="entr" presetSubtype="0" fill="hold" nodeType="withEffect">
+                                  <p:stCondLst>
+                                    <p:cond delay="0"/>
+                                  </p:stCondLst>
+                                  <p:childTnLst>
+                                    <p:set>
+                                      <p:cBhvr>
+                                        <p:cTn id="12" dur="1" fill="hold">
+                                          <p:stCondLst>
+                                            <p:cond delay="0"/>
+                                          </p:stCondLst>
+                                        </p:cTn>
+                                        <p:tgtEl>
+                                          <p:spTgt spid="3">
+                                            <p:txEl>
+                                              <p:pRg st="2" end="2"/>
+                                            </p:txEl>
+                                          </p:spTgt>
+                                        </p:tgtEl>
+                                        <p:attrNameLst>
+                                          <p:attrName>style.visibility</p:attrName>
+                                        </p:attrNameLst>
+                                      </p:cBhvr>
+                                      <p:to>
+                                        <p:strVal val="visible"/>
+                                      </p:to>
+                                    </p:set>
+                                  </p:childTnLst>
+                                </p:cTn>
+                              </p:par>
+                            </p:childTnLst>
+                          </p:cTn>
+                        </p:par>
+                      </p:childTnLst>
+                    </p:cTn>
+                  </p:par>
+                  <p:par>
+                    <p:cTn id="13" fill="hold">
+                      <p:stCondLst>
+                        <p:cond delay="indefinite"/>
+                      </p:stCondLst>
+                      <p:childTnLst>
+                        <p:par>
+                          <p:cTn id="14" fill="hold">
+                            <p:stCondLst>
+                              <p:cond delay="0"/>
+                            </p:stCondLst>
+                            <p:childTnLst>
+                              <p:par>
+                                <p:cTn id="15" presetID="1" presetClass="entr" presetSubtype="0" fill="hold" nodeType="clickEffect">
+                                  <p:stCondLst>
+                                    <p:cond delay="0"/>
+                                  </p:stCondLst>
+                                  <p:childTnLst>
+                                    <p:set>
+                                      <p:cBhvr>
+                                        <p:cTn id="16" dur="1" fill="hold">
+                                          <p:stCondLst>
+                                            <p:cond delay="0"/>
+                                          </p:stCondLst>
+                                        </p:cTn>
+                                        <p:tgtEl>
+                                          <p:spTgt spid="3">
+                                            <p:txEl>
+                                              <p:pRg st="4" end="4"/>
+                                            </p:txEl>
+                                          </p:spTgt>
+                                        </p:tgtEl>
+                                        <p:attrNameLst>
+                                          <p:attrName>style.visibility</p:attrName>
+                                        </p:attrNameLst>
+                                      </p:cBhvr>
+                                      <p:to>
+                                        <p:strVal val="visible"/>
+                                      </p:to>
+                                    </p:set>
+                                  </p:childTnLst>
+                                </p:cTn>
+                              </p:par>
+                            </p:childTnLst>
+                          </p:cTn>
+                        </p:par>
+                      </p:childTnLst>
+                    </p:cTn>
+                  </p:par>
+                  <p:par>
+                    <p:cTn id="17" fill="hold">
+                      <p:stCondLst>
+                        <p:cond delay="indefinite"/>
+                      </p:stCondLst>
+                      <p:childTnLst>
+                        <p:par>
+                          <p:cTn id="18" fill="hold">
+                            <p:stCondLst>
+                              <p:cond delay="0"/>
+                            </p:stCondLst>
+                            <p:childTnLst>
+                              <p:par>
+                                <p:cTn id="19" presetID="1" presetClass="entr" presetSubtype="0" fill="hold" nodeType="clickEffect">
+                                  <p:stCondLst>
+                                    <p:cond delay="0"/>
+                                  </p:stCondLst>
+                                  <p:childTnLst>
+                                    <p:set>
+                                      <p:cBhvr>
+                                        <p:cTn id="20" dur="1" fill="hold">
+                                          <p:stCondLst>
+                                            <p:cond delay="0"/>
+                                          </p:stCondLst>
+                                        </p:cTn>
+                                        <p:tgtEl>
+                                          <p:spTgt spid="3">
+                                            <p:txEl>
+                                              <p:pRg st="5" end="5"/>
+                                            </p:txEl>
+                                          </p:spTgt>
+                                        </p:tgtEl>
+                                        <p:attrNameLst>
+                                          <p:attrName>style.visibility</p:attrName>
+                                        </p:attrNameLst>
+                                      </p:cBhvr>
+                                      <p:to>
+                                        <p:strVal val="visible"/>
+                                      </p:to>
+                                    </p:set>
+                                  </p:childTnLst>
+                                </p:cTn>
+                              </p:par>
+                              <p:par>
+                                <p:cTn id="21" presetID="1" presetClass="entr" presetSubtype="0" fill="hold" nodeType="withEffect">
+                                  <p:stCondLst>
+                                    <p:cond delay="0"/>
+                                  </p:stCondLst>
+                                  <p:childTnLst>
+                                    <p:set>
+                                      <p:cBhvr>
+                                        <p:cTn id="22" dur="1" fill="hold">
+                                          <p:stCondLst>
+                                            <p:cond delay="0"/>
+                                          </p:stCondLst>
+                                        </p:cTn>
+                                        <p:tgtEl>
+                                          <p:spTgt spid="3">
+                                            <p:txEl>
+                                              <p:pRg st="6" end="6"/>
+                                            </p:txEl>
+                                          </p:spTgt>
+                                        </p:tgtEl>
+                                        <p:attrNameLst>
+                                          <p:attrName>style.visibility</p:attrName>
+                                        </p:attrNameLst>
+                                      </p:cBhvr>
+                                      <p:to>
+                                        <p:strVal val="visible"/>
+                                      </p:to>
+                                    </p:set>
+                                  </p:childTnLst>
+                                </p:cTn>
+                              </p:par>
+                            </p:childTnLst>
+                          </p:cTn>
+                        </p:par>
+                      </p:childTnLst>
+                    </p:cTn>
+                  </p:par>
+                  <p:par>
+                    <p:cTn id="23" fill="hold">
+                      <p:stCondLst>
+                        <p:cond delay="indefinite"/>
+                      </p:stCondLst>
+                      <p:childTnLst>
+                        <p:par>
+                          <p:cTn id="24" fill="hold">
+                            <p:stCondLst>
+                              <p:cond delay="0"/>
+                            </p:stCondLst>
+                            <p:childTnLst>
+                              <p:par>
+                                <p:cTn id="25" presetID="1" presetClass="entr" presetSubtype="0" fill="hold" nodeType="clickEffect">
+                                  <p:stCondLst>
+                                    <p:cond delay="0"/>
+                                  </p:stCondLst>
+                                  <p:childTnLst>
+                                    <p:set>
+                                      <p:cBhvr>
+                                        <p:cTn id="26" dur="1" fill="hold">
+                                          <p:stCondLst>
+                                            <p:cond delay="0"/>
+                                          </p:stCondLst>
+                                        </p:cTn>
+                                        <p:tgtEl>
+                                          <p:spTgt spid="3">
+                                            <p:txEl>
+                                              <p:pRg st="7" end="7"/>
+                                            </p:txEl>
+                                          </p:spTgt>
+                                        </p:tgtEl>
+                                        <p:attrNameLst>
+                                          <p:attrName>style.visibility</p:attrName>
+                                        </p:attrNameLst>
+                                      </p:cBhvr>
+                                      <p:to>
+                                        <p:strVal val="visible"/>
+                                      </p:to>
+                                    </p:set>
+                                  </p:childTnLst>
+                                </p:cTn>
+                              </p:par>
+                            </p:childTnLst>
+                          </p:cTn>
+                        </p:par>
+                      </p:childTnLst>
+                    </p:cTn>
+                  </p:par>
+                </p:childTnLst>
+              </p:cTn>
+              <p:prevCondLst>
+                <p:cond evt="onPrev" delay="0">
+                  <p:tgtEl>
+                    <p:sldTgt/>
+                  </p:tgtEl>
+                </p:cond>
+              </p:prevCondLst>
+              <p:nextCondLst>
+                <p:cond evt="onNext" delay="0">
+                  <p:tgtEl>
+                    <p:sldTgt/>
+                  </p:tgtEl>
+                </p:cond>
+              </p:nextCondLst>
+            </p:seq>
+          </p:childTnLst>
+        </p:cTn>
       </p:par>
     </p:tnLst>
   </p:timing>
@@ -3743,51 +4251,236 @@
           <a:p>
             <a:r>
               <a:rPr lang="en-US" dirty="0" smtClean="0"/>
-              <a:t>Election Results (2004 to 2014)</a:t>
+              <a:t>Some takeaways</a:t>
             </a:r>
             <a:endParaRPr lang="en-US" dirty="0"/>
           </a:p>
         </p:txBody>
       </p:sp>
-      <p:pic>
-        <p:nvPicPr>
-          <p:cNvPr id="4" name="Content Placeholder 3"/>
-          <p:cNvPicPr>
-            <a:picLocks noGrp="1" noChangeAspect="1"/>
-          </p:cNvPicPr>
+      <p:sp>
+        <p:nvSpPr>
+          <p:cNvPr id="3" name="Content Placeholder 2"/>
+          <p:cNvSpPr>
+            <a:spLocks noGrp="1"/>
+          </p:cNvSpPr>
           <p:nvPr>
             <p:ph idx="1"/>
           </p:nvPr>
-        </p:nvPicPr>
-        <p:blipFill>
-          <a:blip r:embed="rId2">
-            <a:extLst>
-              <a:ext uri="{28A0092B-C50C-407E-A947-70E740481C1C}">
-                <a14:useLocalDpi xmlns:a14="http://schemas.microsoft.com/office/drawing/2010/main" val="0"/>
-              </a:ext>
-            </a:extLst>
-          </a:blip>
-          <a:stretch>
-            <a:fillRect/>
-          </a:stretch>
-        </p:blipFill>
-        <p:spPr>
-          <a:xfrm>
-            <a:off x="1715498" y="1825625"/>
-            <a:ext cx="8761004" cy="4351338"/>
-          </a:xfrm>
-        </p:spPr>
-      </p:pic>
+        </p:nvSpPr>
+        <p:spPr/>
+        <p:txBody>
+          <a:bodyPr/>
+          <a:lstStyle/>
+          <a:p>
+            <a:r>
+              <a:rPr lang="en-US" dirty="0" smtClean="0"/>
+              <a:t>Many of our conclusions supported already expected conclusions, but no major breakthroughs that we we were hopping for</a:t>
+            </a:r>
+          </a:p>
+          <a:p>
+            <a:r>
+              <a:rPr lang="en-US" dirty="0" smtClean="0"/>
+              <a:t>Stocks aren’t significantly affected by election results</a:t>
+            </a:r>
+          </a:p>
+          <a:p>
+            <a:r>
+              <a:rPr lang="en-US" dirty="0"/>
+              <a:t>If you’re running for congress, make sure to be an incumbent</a:t>
+            </a:r>
+          </a:p>
+          <a:p>
+            <a:endParaRPr lang="en-US" dirty="0"/>
+          </a:p>
+        </p:txBody>
+      </p:sp>
     </p:spTree>
     <p:extLst>
       <p:ext uri="{BB962C8B-B14F-4D97-AF65-F5344CB8AC3E}">
-        <p14:creationId xmlns:p14="http://schemas.microsoft.com/office/powerpoint/2010/main" val="1168294178"/>
+        <p14:creationId xmlns:p14="http://schemas.microsoft.com/office/powerpoint/2010/main" val="379157105"/>
       </p:ext>
     </p:extLst>
   </p:cSld>
   <p:clrMapOvr>
     <a:masterClrMapping/>
   </p:clrMapOvr>
+  <p:timing>
+    <p:tnLst>
+      <p:par>
+        <p:cTn id="1" dur="indefinite" restart="never" nodeType="tmRoot">
+          <p:childTnLst>
+            <p:seq concurrent="1" nextAc="seek">
+              <p:cTn id="2" dur="indefinite" nodeType="mainSeq">
+                <p:childTnLst>
+                  <p:par>
+                    <p:cTn id="3" fill="hold">
+                      <p:stCondLst>
+                        <p:cond delay="indefinite"/>
+                      </p:stCondLst>
+                      <p:childTnLst>
+                        <p:par>
+                          <p:cTn id="4" fill="hold">
+                            <p:stCondLst>
+                              <p:cond delay="0"/>
+                            </p:stCondLst>
+                            <p:childTnLst>
+                              <p:par>
+                                <p:cTn id="5" presetID="1" presetClass="entr" presetSubtype="0" fill="hold" nodeType="clickEffect">
+                                  <p:stCondLst>
+                                    <p:cond delay="0"/>
+                                  </p:stCondLst>
+                                  <p:childTnLst>
+                                    <p:set>
+                                      <p:cBhvr>
+                                        <p:cTn id="6" dur="1" fill="hold">
+                                          <p:stCondLst>
+                                            <p:cond delay="0"/>
+                                          </p:stCondLst>
+                                        </p:cTn>
+                                        <p:tgtEl>
+                                          <p:spTgt spid="3">
+                                            <p:txEl>
+                                              <p:pRg st="0" end="0"/>
+                                            </p:txEl>
+                                          </p:spTgt>
+                                        </p:tgtEl>
+                                        <p:attrNameLst>
+                                          <p:attrName>style.visibility</p:attrName>
+                                        </p:attrNameLst>
+                                      </p:cBhvr>
+                                      <p:to>
+                                        <p:strVal val="visible"/>
+                                      </p:to>
+                                    </p:set>
+                                  </p:childTnLst>
+                                </p:cTn>
+                              </p:par>
+                            </p:childTnLst>
+                          </p:cTn>
+                        </p:par>
+                      </p:childTnLst>
+                    </p:cTn>
+                  </p:par>
+                  <p:par>
+                    <p:cTn id="7" fill="hold">
+                      <p:stCondLst>
+                        <p:cond delay="indefinite"/>
+                      </p:stCondLst>
+                      <p:childTnLst>
+                        <p:par>
+                          <p:cTn id="8" fill="hold">
+                            <p:stCondLst>
+                              <p:cond delay="0"/>
+                            </p:stCondLst>
+                            <p:childTnLst>
+                              <p:par>
+                                <p:cTn id="9" presetID="1" presetClass="entr" presetSubtype="0" fill="hold" nodeType="clickEffect">
+                                  <p:stCondLst>
+                                    <p:cond delay="0"/>
+                                  </p:stCondLst>
+                                  <p:childTnLst>
+                                    <p:set>
+                                      <p:cBhvr>
+                                        <p:cTn id="10" dur="1" fill="hold">
+                                          <p:stCondLst>
+                                            <p:cond delay="0"/>
+                                          </p:stCondLst>
+                                        </p:cTn>
+                                        <p:tgtEl>
+                                          <p:spTgt spid="3">
+                                            <p:txEl>
+                                              <p:pRg st="1" end="1"/>
+                                            </p:txEl>
+                                          </p:spTgt>
+                                        </p:tgtEl>
+                                        <p:attrNameLst>
+                                          <p:attrName>style.visibility</p:attrName>
+                                        </p:attrNameLst>
+                                      </p:cBhvr>
+                                      <p:to>
+                                        <p:strVal val="visible"/>
+                                      </p:to>
+                                    </p:set>
+                                  </p:childTnLst>
+                                </p:cTn>
+                              </p:par>
+                            </p:childTnLst>
+                          </p:cTn>
+                        </p:par>
+                      </p:childTnLst>
+                    </p:cTn>
+                  </p:par>
+                  <p:par>
+                    <p:cTn id="11" fill="hold">
+                      <p:stCondLst>
+                        <p:cond delay="indefinite"/>
+                      </p:stCondLst>
+                      <p:childTnLst>
+                        <p:par>
+                          <p:cTn id="12" fill="hold">
+                            <p:stCondLst>
+                              <p:cond delay="0"/>
+                            </p:stCondLst>
+                            <p:childTnLst>
+                              <p:par>
+                                <p:cTn id="13" presetID="1" presetClass="entr" presetSubtype="0" fill="hold" nodeType="clickEffect">
+                                  <p:stCondLst>
+                                    <p:cond delay="0"/>
+                                  </p:stCondLst>
+                                  <p:childTnLst>
+                                    <p:set>
+                                      <p:cBhvr>
+                                        <p:cTn id="14" dur="1" fill="hold">
+                                          <p:stCondLst>
+                                            <p:cond delay="0"/>
+                                          </p:stCondLst>
+                                        </p:cTn>
+                                        <p:tgtEl>
+                                          <p:spTgt spid="3">
+                                            <p:txEl>
+                                              <p:pRg st="2" end="2"/>
+                                            </p:txEl>
+                                          </p:spTgt>
+                                        </p:tgtEl>
+                                        <p:attrNameLst>
+                                          <p:attrName>style.visibility</p:attrName>
+                                        </p:attrNameLst>
+                                      </p:cBhvr>
+                                      <p:to>
+                                        <p:strVal val="visible"/>
+                                      </p:to>
+                                    </p:set>
+                                  </p:childTnLst>
+                                </p:cTn>
+                              </p:par>
+                            </p:childTnLst>
+                          </p:cTn>
+                        </p:par>
+                      </p:childTnLst>
+                    </p:cTn>
+                  </p:par>
+                </p:childTnLst>
+              </p:cTn>
+              <p:prevCondLst>
+                <p:cond evt="onPrev" delay="0">
+                  <p:tgtEl>
+                    <p:sldTgt/>
+                  </p:tgtEl>
+                </p:cond>
+              </p:prevCondLst>
+              <p:nextCondLst>
+                <p:cond evt="onNext" delay="0">
+                  <p:tgtEl>
+                    <p:sldTgt/>
+                  </p:tgtEl>
+                </p:cond>
+              </p:nextCondLst>
+            </p:seq>
+          </p:childTnLst>
+        </p:cTn>
+      </p:par>
+    </p:tnLst>
+  </p:timing>
 </p:sld>
 </file>
 
@@ -3818,16 +4511,24 @@
             <p:ph type="title"/>
           </p:nvPr>
         </p:nvSpPr>
-        <p:spPr/>
-        <p:txBody>
-          <a:bodyPr/>
-          <a:lstStyle/>
-          <a:p>
-            <a:r>
-              <a:rPr lang="en-US" dirty="0" smtClean="0"/>
-              <a:t>Some takeaways</a:t>
-            </a:r>
-            <a:endParaRPr lang="en-US" dirty="0"/>
+        <p:spPr>
+          <a:xfrm>
+            <a:off x="838200" y="2242801"/>
+            <a:ext cx="10515600" cy="1325563"/>
+          </a:xfrm>
+        </p:spPr>
+        <p:txBody>
+          <a:bodyPr>
+            <a:normAutofit fontScale="90000"/>
+          </a:bodyPr>
+          <a:lstStyle/>
+          <a:p>
+            <a:pPr algn="ctr"/>
+            <a:r>
+              <a:rPr lang="en-US" sz="6000" dirty="0" smtClean="0"/>
+              <a:t>Opportunities for Future Research</a:t>
+            </a:r>
+            <a:endParaRPr lang="en-US" sz="6000" dirty="0"/>
           </a:p>
         </p:txBody>
       </p:sp>
@@ -3841,37 +4542,29 @@
             <p:ph idx="1"/>
           </p:nvPr>
         </p:nvSpPr>
-        <p:spPr/>
-        <p:txBody>
-          <a:bodyPr/>
-          <a:lstStyle/>
-          <a:p>
-            <a:r>
-              <a:rPr lang="en-US" dirty="0" smtClean="0"/>
-              <a:t>Many of our conclusions supported already expected conclusions, but no major breakthroughs that we we were hopping for</a:t>
-            </a:r>
-          </a:p>
-          <a:p>
-            <a:r>
-              <a:rPr lang="en-US" dirty="0" smtClean="0"/>
-              <a:t>Stocks aren’t significantly affected by election results</a:t>
-            </a:r>
-          </a:p>
-          <a:p>
-            <a:r>
-              <a:rPr lang="en-US" dirty="0"/>
-              <a:t>If you’re running for congress, make sure to be an incumbent</a:t>
-            </a:r>
-          </a:p>
-          <a:p>
-            <a:endParaRPr lang="en-US" dirty="0"/>
+        <p:spPr>
+          <a:xfrm>
+            <a:off x="838200" y="3568364"/>
+            <a:ext cx="10515600" cy="2875467"/>
+          </a:xfrm>
+        </p:spPr>
+        <p:txBody>
+          <a:bodyPr>
+            <a:normAutofit/>
+          </a:bodyPr>
+          <a:lstStyle/>
+          <a:p>
+            <a:pPr marL="0" indent="0" algn="ctr">
+              <a:buNone/>
+            </a:pPr>
+            <a:endParaRPr lang="en-US" sz="2400" dirty="0"/>
           </a:p>
         </p:txBody>
       </p:sp>
     </p:spTree>
     <p:extLst>
       <p:ext uri="{BB962C8B-B14F-4D97-AF65-F5344CB8AC3E}">
-        <p14:creationId xmlns:p14="http://schemas.microsoft.com/office/powerpoint/2010/main" val="379157105"/>
+        <p14:creationId xmlns:p14="http://schemas.microsoft.com/office/powerpoint/2010/main" val="167642849"/>
       </p:ext>
     </p:extLst>
   </p:cSld>
@@ -3882,6 +4575,441 @@
     <p:tnLst>
       <p:par>
         <p:cTn id="1" dur="indefinite" restart="never" nodeType="tmRoot"/>
+      </p:par>
+    </p:tnLst>
+  </p:timing>
+</p:sld>
+</file>
+
+<file path=ppt/slides/slide5.xml><?xml version="1.0" encoding="utf-8"?>
+<p:sld xmlns:a="http://schemas.openxmlformats.org/drawingml/2006/main" xmlns:r="http://schemas.openxmlformats.org/officeDocument/2006/relationships" xmlns:p="http://schemas.openxmlformats.org/presentationml/2006/main">
+  <p:cSld>
+    <p:spTree>
+      <p:nvGrpSpPr>
+        <p:cNvPr id="1" name=""/>
+        <p:cNvGrpSpPr/>
+        <p:nvPr/>
+      </p:nvGrpSpPr>
+      <p:grpSpPr>
+        <a:xfrm>
+          <a:off x="0" y="0"/>
+          <a:ext cx="0" cy="0"/>
+          <a:chOff x="0" y="0"/>
+          <a:chExt cx="0" cy="0"/>
+        </a:xfrm>
+      </p:grpSpPr>
+      <p:sp>
+        <p:nvSpPr>
+          <p:cNvPr id="2" name="Title 1"/>
+          <p:cNvSpPr>
+            <a:spLocks noGrp="1"/>
+          </p:cNvSpPr>
+          <p:nvPr>
+            <p:ph type="title"/>
+          </p:nvPr>
+        </p:nvSpPr>
+        <p:spPr/>
+        <p:txBody>
+          <a:bodyPr/>
+          <a:lstStyle/>
+          <a:p>
+            <a:r>
+              <a:rPr lang="en-US" dirty="0" smtClean="0"/>
+              <a:t>What could we do later on?	</a:t>
+            </a:r>
+            <a:endParaRPr lang="en-US" dirty="0"/>
+          </a:p>
+        </p:txBody>
+      </p:sp>
+      <p:sp>
+        <p:nvSpPr>
+          <p:cNvPr id="3" name="Content Placeholder 2"/>
+          <p:cNvSpPr>
+            <a:spLocks noGrp="1"/>
+          </p:cNvSpPr>
+          <p:nvPr>
+            <p:ph idx="1"/>
+          </p:nvPr>
+        </p:nvSpPr>
+        <p:spPr/>
+        <p:txBody>
+          <a:bodyPr/>
+          <a:lstStyle/>
+          <a:p>
+            <a:r>
+              <a:rPr lang="en-US" dirty="0" smtClean="0"/>
+              <a:t>Look into Presidential Campaigns</a:t>
+            </a:r>
+          </a:p>
+          <a:p>
+            <a:pPr lvl="1"/>
+            <a:r>
+              <a:rPr lang="en-US" dirty="0" smtClean="0"/>
+              <a:t>This would involve getting more data</a:t>
+            </a:r>
+          </a:p>
+          <a:p>
+            <a:r>
+              <a:rPr lang="en-US" dirty="0" smtClean="0"/>
+              <a:t>Closely see which “Industries” have the most sway</a:t>
+            </a:r>
+          </a:p>
+          <a:p>
+            <a:r>
+              <a:rPr lang="en-US" dirty="0" smtClean="0"/>
+              <a:t>Closely examine difference between Senate and House candidates</a:t>
+            </a:r>
+          </a:p>
+          <a:p>
+            <a:pPr lvl="1"/>
+            <a:r>
+              <a:rPr lang="en-US" dirty="0"/>
+              <a:t>This project lump them </a:t>
+            </a:r>
+            <a:r>
+              <a:rPr lang="en-US" dirty="0" smtClean="0"/>
+              <a:t>together</a:t>
+            </a:r>
+          </a:p>
+          <a:p>
+            <a:r>
+              <a:rPr lang="en-US" dirty="0" smtClean="0"/>
+              <a:t>Look at differences from state to state</a:t>
+            </a:r>
+          </a:p>
+        </p:txBody>
+      </p:sp>
+    </p:spTree>
+    <p:extLst>
+      <p:ext uri="{BB962C8B-B14F-4D97-AF65-F5344CB8AC3E}">
+        <p14:creationId xmlns:p14="http://schemas.microsoft.com/office/powerpoint/2010/main" val="781757011"/>
+      </p:ext>
+    </p:extLst>
+  </p:cSld>
+  <p:clrMapOvr>
+    <a:masterClrMapping/>
+  </p:clrMapOvr>
+  <p:timing>
+    <p:tnLst>
+      <p:par>
+        <p:cTn id="1" dur="indefinite" restart="never" nodeType="tmRoot">
+          <p:childTnLst>
+            <p:seq concurrent="1" nextAc="seek">
+              <p:cTn id="2" dur="indefinite" nodeType="mainSeq">
+                <p:childTnLst>
+                  <p:par>
+                    <p:cTn id="3" fill="hold">
+                      <p:stCondLst>
+                        <p:cond delay="indefinite"/>
+                      </p:stCondLst>
+                      <p:childTnLst>
+                        <p:par>
+                          <p:cTn id="4" fill="hold">
+                            <p:stCondLst>
+                              <p:cond delay="0"/>
+                            </p:stCondLst>
+                            <p:childTnLst>
+                              <p:par>
+                                <p:cTn id="5" presetID="1" presetClass="entr" presetSubtype="0" fill="hold" nodeType="clickEffect">
+                                  <p:stCondLst>
+                                    <p:cond delay="0"/>
+                                  </p:stCondLst>
+                                  <p:childTnLst>
+                                    <p:set>
+                                      <p:cBhvr>
+                                        <p:cTn id="6" dur="1" fill="hold">
+                                          <p:stCondLst>
+                                            <p:cond delay="0"/>
+                                          </p:stCondLst>
+                                        </p:cTn>
+                                        <p:tgtEl>
+                                          <p:spTgt spid="3">
+                                            <p:txEl>
+                                              <p:pRg st="0" end="0"/>
+                                            </p:txEl>
+                                          </p:spTgt>
+                                        </p:tgtEl>
+                                        <p:attrNameLst>
+                                          <p:attrName>style.visibility</p:attrName>
+                                        </p:attrNameLst>
+                                      </p:cBhvr>
+                                      <p:to>
+                                        <p:strVal val="visible"/>
+                                      </p:to>
+                                    </p:set>
+                                  </p:childTnLst>
+                                </p:cTn>
+                              </p:par>
+                            </p:childTnLst>
+                          </p:cTn>
+                        </p:par>
+                      </p:childTnLst>
+                    </p:cTn>
+                  </p:par>
+                  <p:par>
+                    <p:cTn id="7" fill="hold">
+                      <p:stCondLst>
+                        <p:cond delay="indefinite"/>
+                      </p:stCondLst>
+                      <p:childTnLst>
+                        <p:par>
+                          <p:cTn id="8" fill="hold">
+                            <p:stCondLst>
+                              <p:cond delay="0"/>
+                            </p:stCondLst>
+                            <p:childTnLst>
+                              <p:par>
+                                <p:cTn id="9" presetID="1" presetClass="entr" presetSubtype="0" fill="hold" nodeType="clickEffect">
+                                  <p:stCondLst>
+                                    <p:cond delay="0"/>
+                                  </p:stCondLst>
+                                  <p:childTnLst>
+                                    <p:set>
+                                      <p:cBhvr>
+                                        <p:cTn id="10" dur="1" fill="hold">
+                                          <p:stCondLst>
+                                            <p:cond delay="0"/>
+                                          </p:stCondLst>
+                                        </p:cTn>
+                                        <p:tgtEl>
+                                          <p:spTgt spid="3">
+                                            <p:txEl>
+                                              <p:pRg st="1" end="1"/>
+                                            </p:txEl>
+                                          </p:spTgt>
+                                        </p:tgtEl>
+                                        <p:attrNameLst>
+                                          <p:attrName>style.visibility</p:attrName>
+                                        </p:attrNameLst>
+                                      </p:cBhvr>
+                                      <p:to>
+                                        <p:strVal val="visible"/>
+                                      </p:to>
+                                    </p:set>
+                                  </p:childTnLst>
+                                </p:cTn>
+                              </p:par>
+                            </p:childTnLst>
+                          </p:cTn>
+                        </p:par>
+                      </p:childTnLst>
+                    </p:cTn>
+                  </p:par>
+                  <p:par>
+                    <p:cTn id="11" fill="hold">
+                      <p:stCondLst>
+                        <p:cond delay="indefinite"/>
+                      </p:stCondLst>
+                      <p:childTnLst>
+                        <p:par>
+                          <p:cTn id="12" fill="hold">
+                            <p:stCondLst>
+                              <p:cond delay="0"/>
+                            </p:stCondLst>
+                            <p:childTnLst>
+                              <p:par>
+                                <p:cTn id="13" presetID="1" presetClass="entr" presetSubtype="0" fill="hold" nodeType="clickEffect">
+                                  <p:stCondLst>
+                                    <p:cond delay="0"/>
+                                  </p:stCondLst>
+                                  <p:childTnLst>
+                                    <p:set>
+                                      <p:cBhvr>
+                                        <p:cTn id="14" dur="1" fill="hold">
+                                          <p:stCondLst>
+                                            <p:cond delay="0"/>
+                                          </p:stCondLst>
+                                        </p:cTn>
+                                        <p:tgtEl>
+                                          <p:spTgt spid="3">
+                                            <p:txEl>
+                                              <p:pRg st="2" end="2"/>
+                                            </p:txEl>
+                                          </p:spTgt>
+                                        </p:tgtEl>
+                                        <p:attrNameLst>
+                                          <p:attrName>style.visibility</p:attrName>
+                                        </p:attrNameLst>
+                                      </p:cBhvr>
+                                      <p:to>
+                                        <p:strVal val="visible"/>
+                                      </p:to>
+                                    </p:set>
+                                  </p:childTnLst>
+                                </p:cTn>
+                              </p:par>
+                            </p:childTnLst>
+                          </p:cTn>
+                        </p:par>
+                      </p:childTnLst>
+                    </p:cTn>
+                  </p:par>
+                  <p:par>
+                    <p:cTn id="15" fill="hold">
+                      <p:stCondLst>
+                        <p:cond delay="indefinite"/>
+                      </p:stCondLst>
+                      <p:childTnLst>
+                        <p:par>
+                          <p:cTn id="16" fill="hold">
+                            <p:stCondLst>
+                              <p:cond delay="0"/>
+                            </p:stCondLst>
+                            <p:childTnLst>
+                              <p:par>
+                                <p:cTn id="17" presetID="1" presetClass="entr" presetSubtype="0" fill="hold" nodeType="clickEffect">
+                                  <p:stCondLst>
+                                    <p:cond delay="0"/>
+                                  </p:stCondLst>
+                                  <p:childTnLst>
+                                    <p:set>
+                                      <p:cBhvr>
+                                        <p:cTn id="18" dur="1" fill="hold">
+                                          <p:stCondLst>
+                                            <p:cond delay="0"/>
+                                          </p:stCondLst>
+                                        </p:cTn>
+                                        <p:tgtEl>
+                                          <p:spTgt spid="3">
+                                            <p:txEl>
+                                              <p:pRg st="3" end="3"/>
+                                            </p:txEl>
+                                          </p:spTgt>
+                                        </p:tgtEl>
+                                        <p:attrNameLst>
+                                          <p:attrName>style.visibility</p:attrName>
+                                        </p:attrNameLst>
+                                      </p:cBhvr>
+                                      <p:to>
+                                        <p:strVal val="visible"/>
+                                      </p:to>
+                                    </p:set>
+                                  </p:childTnLst>
+                                </p:cTn>
+                              </p:par>
+                            </p:childTnLst>
+                          </p:cTn>
+                        </p:par>
+                      </p:childTnLst>
+                    </p:cTn>
+                  </p:par>
+                  <p:par>
+                    <p:cTn id="19" fill="hold">
+                      <p:stCondLst>
+                        <p:cond delay="indefinite"/>
+                      </p:stCondLst>
+                      <p:childTnLst>
+                        <p:par>
+                          <p:cTn id="20" fill="hold">
+                            <p:stCondLst>
+                              <p:cond delay="0"/>
+                            </p:stCondLst>
+                            <p:childTnLst>
+                              <p:par>
+                                <p:cTn id="21" presetID="1" presetClass="entr" presetSubtype="0" fill="hold" nodeType="clickEffect">
+                                  <p:stCondLst>
+                                    <p:cond delay="0"/>
+                                  </p:stCondLst>
+                                  <p:childTnLst>
+                                    <p:set>
+                                      <p:cBhvr>
+                                        <p:cTn id="22" dur="1" fill="hold">
+                                          <p:stCondLst>
+                                            <p:cond delay="0"/>
+                                          </p:stCondLst>
+                                        </p:cTn>
+                                        <p:tgtEl>
+                                          <p:spTgt spid="3">
+                                            <p:txEl>
+                                              <p:pRg st="4" end="4"/>
+                                            </p:txEl>
+                                          </p:spTgt>
+                                        </p:tgtEl>
+                                        <p:attrNameLst>
+                                          <p:attrName>style.visibility</p:attrName>
+                                        </p:attrNameLst>
+                                      </p:cBhvr>
+                                      <p:to>
+                                        <p:strVal val="visible"/>
+                                      </p:to>
+                                    </p:set>
+                                  </p:childTnLst>
+                                </p:cTn>
+                              </p:par>
+                            </p:childTnLst>
+                          </p:cTn>
+                        </p:par>
+                      </p:childTnLst>
+                    </p:cTn>
+                  </p:par>
+                  <p:par>
+                    <p:cTn id="23" fill="hold">
+                      <p:stCondLst>
+                        <p:cond delay="indefinite"/>
+                      </p:stCondLst>
+                      <p:childTnLst>
+                        <p:par>
+                          <p:cTn id="24" fill="hold">
+                            <p:stCondLst>
+                              <p:cond delay="0"/>
+                            </p:stCondLst>
+                            <p:childTnLst>
+                              <p:par>
+                                <p:cTn id="25" presetID="1" presetClass="entr" presetSubtype="0" fill="hold" nodeType="clickEffect">
+                                  <p:stCondLst>
+                                    <p:cond delay="0"/>
+                                  </p:stCondLst>
+                                  <p:childTnLst>
+                                    <p:set>
+                                      <p:cBhvr>
+                                        <p:cTn id="26" dur="1" fill="hold">
+                                          <p:stCondLst>
+                                            <p:cond delay="0"/>
+                                          </p:stCondLst>
+                                        </p:cTn>
+                                        <p:tgtEl>
+                                          <p:spTgt spid="3">
+                                            <p:txEl>
+                                              <p:pRg st="5" end="5"/>
+                                            </p:txEl>
+                                          </p:spTgt>
+                                        </p:tgtEl>
+                                        <p:attrNameLst>
+                                          <p:attrName>style.visibility</p:attrName>
+                                        </p:attrNameLst>
+                                      </p:cBhvr>
+                                      <p:to>
+                                        <p:strVal val="visible"/>
+                                      </p:to>
+                                    </p:set>
+                                  </p:childTnLst>
+                                </p:cTn>
+                              </p:par>
+                            </p:childTnLst>
+                          </p:cTn>
+                        </p:par>
+                      </p:childTnLst>
+                    </p:cTn>
+                  </p:par>
+                </p:childTnLst>
+              </p:cTn>
+              <p:prevCondLst>
+                <p:cond evt="onPrev" delay="0">
+                  <p:tgtEl>
+                    <p:sldTgt/>
+                  </p:tgtEl>
+                </p:cond>
+              </p:prevCondLst>
+              <p:nextCondLst>
+                <p:cond evt="onNext" delay="0">
+                  <p:tgtEl>
+                    <p:sldTgt/>
+                  </p:tgtEl>
+                </p:cond>
+              </p:nextCondLst>
+            </p:seq>
+          </p:childTnLst>
+        </p:cTn>
       </p:par>
     </p:tnLst>
   </p:timing>

</xml_diff>

<commit_message>
Arif's slides - final
</commit_message>
<xml_diff>
--- a/Arif Slides.pptx
+++ b/Arif Slides.pptx
@@ -4651,20 +4651,22 @@
           <a:p>
             <a:r>
               <a:rPr lang="en-US" dirty="0" smtClean="0"/>
-              <a:t>Closely see which “Industries” have the most sway</a:t>
-            </a:r>
-          </a:p>
-          <a:p>
+              <a:t>Closely </a:t>
+            </a:r>
             <a:r>
               <a:rPr lang="en-US" dirty="0" smtClean="0"/>
-              <a:t>Closely examine difference between Senate and House candidates</a:t>
+              <a:t>examine difference between Senate and House candidates</a:t>
             </a:r>
           </a:p>
           <a:p>
             <a:pPr lvl="1"/>
             <a:r>
               <a:rPr lang="en-US" dirty="0"/>
-              <a:t>This project lump them </a:t>
+              <a:t>This project </a:t>
+            </a:r>
+            <a:r>
+              <a:rPr lang="en-US" dirty="0" smtClean="0"/>
+              <a:t>lumped them </a:t>
             </a:r>
             <a:r>
               <a:rPr lang="en-US" dirty="0" smtClean="0"/>
@@ -4922,55 +4924,6 @@
                                           <p:spTgt spid="3">
                                             <p:txEl>
                                               <p:pRg st="4" end="4"/>
-                                            </p:txEl>
-                                          </p:spTgt>
-                                        </p:tgtEl>
-                                        <p:attrNameLst>
-                                          <p:attrName>style.visibility</p:attrName>
-                                        </p:attrNameLst>
-                                      </p:cBhvr>
-                                      <p:to>
-                                        <p:strVal val="visible"/>
-                                      </p:to>
-                                    </p:set>
-                                  </p:childTnLst>
-                                </p:cTn>
-                              </p:par>
-                            </p:childTnLst>
-                          </p:cTn>
-                        </p:par>
-                      </p:childTnLst>
-                    </p:cTn>
-                  </p:par>
-                  <p:par>
-                    <p:cTn id="23" fill="hold">
-                      <p:stCondLst>
-                        <p:cond delay="indefinite"/>
-                      </p:stCondLst>
-                      <p:childTnLst>
-                        <p:par>
-                          <p:cTn id="24" fill="hold">
-                            <p:stCondLst>
-                              <p:cond delay="0"/>
-                            </p:stCondLst>
-                            <p:childTnLst>
-                              <p:par>
-                                <p:cTn id="25" presetID="1" presetClass="entr" presetSubtype="0" fill="hold" nodeType="clickEffect">
-                                  <p:stCondLst>
-                                    <p:cond delay="0"/>
-                                  </p:stCondLst>
-                                  <p:childTnLst>
-                                    <p:set>
-                                      <p:cBhvr>
-                                        <p:cTn id="26" dur="1" fill="hold">
-                                          <p:stCondLst>
-                                            <p:cond delay="0"/>
-                                          </p:stCondLst>
-                                        </p:cTn>
-                                        <p:tgtEl>
-                                          <p:spTgt spid="3">
-                                            <p:txEl>
-                                              <p:pRg st="5" end="5"/>
                                             </p:txEl>
                                           </p:spTgt>
                                         </p:tgtEl>

</xml_diff>